<commit_message>
Digital Health Card PPt
</commit_message>
<xml_diff>
--- a/Digital Health Card PPT.pptx
+++ b/Digital Health Card PPT.pptx
@@ -7691,9 +7691,38 @@
           <a:chExt cx="0" cy="0"/>
         </a:xfrm>
       </p:grpSpPr>
+      <p:sp>
+        <p:nvSpPr>
+          <p:cNvPr id="3" name="Rectangle 2"/>
+          <p:cNvSpPr/>
+          <p:nvPr/>
+        </p:nvSpPr>
+        <p:spPr>
+          <a:xfrm>
+            <a:off x="4004415" y="423860"/>
+            <a:ext cx="4447051" cy="707886"/>
+          </a:xfrm>
+          <a:prstGeom prst="rect">
+            <a:avLst/>
+          </a:prstGeom>
+        </p:spPr>
+        <p:txBody>
+          <a:bodyPr wrap="none">
+            <a:spAutoFit/>
+          </a:bodyPr>
+          <a:lstStyle/>
+          <a:p>
+            <a:r>
+              <a:rPr lang="en-US" sz="4000" b="1" dirty="0" smtClean="0"/>
+              <a:t>Data Flow Diagram</a:t>
+            </a:r>
+            <a:endParaRPr lang="en-IN" sz="4000" b="1" dirty="0"/>
+          </a:p>
+        </p:txBody>
+      </p:sp>
       <p:pic>
         <p:nvPicPr>
-          <p:cNvPr id="2" name="Picture 1"/>
+          <p:cNvPr id="4" name="Picture 3"/>
           <p:cNvPicPr>
             <a:picLocks noChangeAspect="1"/>
           </p:cNvPicPr>
@@ -7707,43 +7736,14 @@
         </p:blipFill>
         <p:spPr>
           <a:xfrm>
-            <a:off x="1378039" y="1558343"/>
-            <a:ext cx="8731876" cy="5125792"/>
+            <a:off x="850143" y="1460458"/>
+            <a:ext cx="10498015" cy="5223678"/>
           </a:xfrm>
           <a:prstGeom prst="rect">
             <a:avLst/>
           </a:prstGeom>
         </p:spPr>
       </p:pic>
-      <p:sp>
-        <p:nvSpPr>
-          <p:cNvPr id="3" name="Rectangle 2"/>
-          <p:cNvSpPr/>
-          <p:nvPr/>
-        </p:nvSpPr>
-        <p:spPr>
-          <a:xfrm>
-            <a:off x="4004415" y="423860"/>
-            <a:ext cx="4447051" cy="707886"/>
-          </a:xfrm>
-          <a:prstGeom prst="rect">
-            <a:avLst/>
-          </a:prstGeom>
-        </p:spPr>
-        <p:txBody>
-          <a:bodyPr wrap="none">
-            <a:spAutoFit/>
-          </a:bodyPr>
-          <a:lstStyle/>
-          <a:p>
-            <a:r>
-              <a:rPr lang="en-US" sz="4000" b="1" dirty="0" smtClean="0"/>
-              <a:t>Data Flow Diagram</a:t>
-            </a:r>
-            <a:endParaRPr lang="en-IN" sz="4000" b="1" dirty="0"/>
-          </a:p>
-        </p:txBody>
-      </p:sp>
     </p:spTree>
     <p:extLst>
       <p:ext uri="{BB962C8B-B14F-4D97-AF65-F5344CB8AC3E}">
@@ -8347,7 +8347,7 @@
         <p:spPr>
           <a:xfrm>
             <a:off x="1828800" y="1661375"/>
-            <a:ext cx="7250806" cy="3693319"/>
+            <a:ext cx="7250806" cy="4247317"/>
           </a:xfrm>
           <a:prstGeom prst="rect">
             <a:avLst/>
@@ -8407,8 +8407,21 @@
             </a:r>
             <a:r>
               <a:rPr lang="en-IN" dirty="0"/>
-              <a:t>Operating System: Windows 10 or Later</a:t>
-            </a:r>
+              <a:t>Operating System: </a:t>
+            </a:r>
+            <a:r>
+              <a:rPr lang="en-IN" dirty="0" smtClean="0"/>
+              <a:t>Any Operating System(Windows ,</a:t>
+            </a:r>
+            <a:r>
+              <a:rPr lang="en-IN" dirty="0" err="1" smtClean="0"/>
+              <a:t>Linux,MacOs</a:t>
+            </a:r>
+            <a:r>
+              <a:rPr lang="en-IN" dirty="0" smtClean="0"/>
+              <a:t>)</a:t>
+            </a:r>
+            <a:endParaRPr lang="en-IN" dirty="0"/>
           </a:p>
           <a:p>
             <a:r>
@@ -8417,7 +8430,19 @@
             </a:r>
             <a:r>
               <a:rPr lang="en-IN" dirty="0"/>
-              <a:t>Frontend: HTML, CSS, </a:t>
+              <a:t>Frontend: HTML, </a:t>
+            </a:r>
+            <a:r>
+              <a:rPr lang="en-IN" dirty="0" smtClean="0"/>
+              <a:t>CSS(</a:t>
+            </a:r>
+            <a:r>
+              <a:rPr lang="en-IN" dirty="0" err="1" smtClean="0"/>
+              <a:t>TalwindCSS</a:t>
+            </a:r>
+            <a:r>
+              <a:rPr lang="en-IN" dirty="0" smtClean="0"/>
+              <a:t>), </a:t>
             </a:r>
             <a:r>
               <a:rPr lang="en-IN" dirty="0" err="1"/>
@@ -8434,12 +8459,8 @@
               <a:t>           Backend: ASP.NET </a:t>
             </a:r>
             <a:r>
-              <a:rPr lang="en-IN" smtClean="0"/>
-              <a:t>Core 8.0 Web </a:t>
-            </a:r>
-            <a:r>
               <a:rPr lang="en-IN" dirty="0" smtClean="0"/>
-              <a:t>App</a:t>
+              <a:t>Core 8.0 Web App</a:t>
             </a:r>
             <a:endParaRPr lang="en-IN" dirty="0"/>
           </a:p>
@@ -8452,6 +8473,20 @@
               <a:rPr lang="en-IN" dirty="0" smtClean="0"/>
               <a:t>MYSQL</a:t>
             </a:r>
+          </a:p>
+          <a:p>
+            <a:r>
+              <a:rPr lang="en-US" dirty="0" smtClean="0"/>
+              <a:t>           Browser :Google Chrome / Mozilla </a:t>
+            </a:r>
+            <a:r>
+              <a:rPr lang="en-US" dirty="0" err="1" smtClean="0"/>
+              <a:t>FireFox</a:t>
+            </a:r>
+            <a:r>
+              <a:rPr lang="en-US" dirty="0" smtClean="0"/>
+              <a:t> / Microsoft Edge</a:t>
+            </a:r>
             <a:endParaRPr lang="en-IN" dirty="0"/>
           </a:p>
           <a:p>
@@ -8468,8 +8503,15 @@
           <a:p>
             <a:r>
               <a:rPr lang="en-IN" dirty="0"/>
-              <a:t>           IDE: Visual Studio, VS Code</a:t>
-            </a:r>
+              <a:t>           IDE: Visual Studio, VS </a:t>
+            </a:r>
+            <a:r>
+              <a:rPr lang="en-IN" dirty="0" smtClean="0"/>
+              <a:t>Code</a:t>
+            </a:r>
+          </a:p>
+          <a:p>
+            <a:endParaRPr lang="en-IN" dirty="0"/>
           </a:p>
           <a:p>
             <a:endParaRPr lang="en-IN" dirty="0"/>

</xml_diff>